<commit_message>
Updates on the instruction
</commit_message>
<xml_diff>
--- a/Collaterals/SOASuite12c_Part3.pptx
+++ b/Collaterals/SOASuite12c_Part3.pptx
@@ -14929,15 +14929,7 @@
                   <a:srgbClr val="C00000"/>
                 </a:solidFill>
               </a:rPr>
-              <a:t> </a:t>
-            </a:r>
-            <a:r>
-              <a:rPr lang="sv-SE" dirty="0" smtClean="0">
-                <a:solidFill>
-                  <a:srgbClr val="C00000"/>
-                </a:solidFill>
-              </a:rPr>
-              <a:t>set </a:t>
+              <a:t> set </a:t>
             </a:r>
             <a:r>
               <a:rPr lang="sv-SE" dirty="0" smtClean="0"/>
@@ -15059,11 +15051,7 @@
             </a:r>
             <a:r>
               <a:rPr lang="sv-SE" dirty="0" smtClean="0"/>
-              <a:t>it</a:t>
-            </a:r>
-            <a:r>
-              <a:rPr lang="sv-SE" dirty="0" smtClean="0"/>
-              <a:t>.</a:t>
+              <a:t>it.</a:t>
             </a:r>
           </a:p>
           <a:p>
@@ -15259,11 +15247,7 @@
             </a:r>
             <a:r>
               <a:rPr lang="sv-SE" dirty="0" smtClean="0"/>
-              <a:t> as </a:t>
-            </a:r>
-            <a:r>
-              <a:rPr lang="sv-SE" dirty="0" smtClean="0"/>
-              <a:t>a </a:t>
+              <a:t> as a </a:t>
             </a:r>
             <a:r>
               <a:rPr lang="sv-SE" dirty="0" smtClean="0">
@@ -15277,7 +15261,6 @@
               <a:rPr lang="sv-SE" dirty="0" smtClean="0"/>
               <a:t>.</a:t>
             </a:r>
-            <a:endParaRPr lang="sv-SE" dirty="0" smtClean="0"/>
           </a:p>
         </p:txBody>
       </p:sp>
@@ -15384,11 +15367,7 @@
             </a:r>
             <a:r>
               <a:rPr lang="sv-SE" dirty="0" smtClean="0"/>
-              <a:t>: The </a:t>
-            </a:r>
-            <a:r>
-              <a:rPr lang="sv-SE" dirty="0" smtClean="0"/>
-              <a:t>RETE </a:t>
+              <a:t>: The RETE </a:t>
             </a:r>
             <a:r>
               <a:rPr lang="sv-SE" dirty="0" err="1" smtClean="0"/>
@@ -17017,10 +16996,59 @@
         </p:nvSpPr>
         <p:spPr/>
         <p:txBody>
-          <a:bodyPr/>
+          <a:bodyPr>
+            <a:normAutofit/>
+          </a:bodyPr>
           <a:lstStyle/>
           <a:p>
-            <a:endParaRPr lang="sv-SE"/>
+            <a:r>
+              <a:rPr lang="en-US" dirty="0"/>
+              <a:t>Human interactions with </a:t>
+            </a:r>
+            <a:r>
+              <a:rPr lang="en-US" dirty="0" smtClean="0"/>
+              <a:t>processes </a:t>
+            </a:r>
+          </a:p>
+          <a:p>
+            <a:r>
+              <a:rPr lang="en-US" dirty="0" smtClean="0"/>
+              <a:t>Scheduling of human activities</a:t>
+            </a:r>
+            <a:endParaRPr lang="en-US" dirty="0"/>
+          </a:p>
+          <a:p>
+            <a:r>
+              <a:rPr lang="en-US" dirty="0" smtClean="0"/>
+              <a:t>Human task management e.g. through an existing </a:t>
+            </a:r>
+            <a:r>
+              <a:rPr lang="en-US" dirty="0" err="1" smtClean="0"/>
+              <a:t>worklist</a:t>
+            </a:r>
+            <a:r>
+              <a:rPr lang="en-US" dirty="0" smtClean="0"/>
+              <a:t> </a:t>
+            </a:r>
+            <a:r>
+              <a:rPr lang="en-US" dirty="0"/>
+              <a:t>application (Oracle BPM </a:t>
+            </a:r>
+            <a:r>
+              <a:rPr lang="en-US" dirty="0" err="1"/>
+              <a:t>Worklist</a:t>
+            </a:r>
+            <a:r>
+              <a:rPr lang="en-US" dirty="0"/>
+              <a:t>)</a:t>
+            </a:r>
+          </a:p>
+          <a:p>
+            <a:r>
+              <a:rPr lang="en-US" dirty="0" smtClean="0"/>
+              <a:t>Workers can be assigned Organizational roles and tasks can be automatically dispatched between different workers based on their work load.</a:t>
+            </a:r>
+            <a:endParaRPr lang="en-US" dirty="0"/>
           </a:p>
         </p:txBody>
       </p:sp>

</xml_diff>